<commit_message>
Minor update of ppt with format
</commit_message>
<xml_diff>
--- a/reports/Presentation for Management Team.pptx
+++ b/reports/Presentation for Management Team.pptx
@@ -112,6 +112,11 @@
       </a:defRPr>
     </a:lvl9pPr>
   </p:defaultTextStyle>
+  <p:extLst>
+    <p:ext uri="{EFAFB233-063F-42B5-8137-9DF3F51BA10A}">
+      <p15:sldGuideLst xmlns:p15="http://schemas.microsoft.com/office/powerpoint/2012/main"/>
+    </p:ext>
+  </p:extLst>
 </p:presentation>
 </file>
 
@@ -3352,7 +3357,7 @@
           <a:p>
             <a:r>
               <a:rPr lang="en-US" b="1" dirty="0"/>
-              <a:t>Big Mountain ticket price modeling &amp;prediction</a:t>
+              <a:t>Big Mountain ticket price modeling &amp; prediction</a:t>
             </a:r>
           </a:p>
         </p:txBody>
@@ -5454,74 +5459,6 @@
       </p:grpSpPr>
       <p:sp>
         <p:nvSpPr>
-          <p:cNvPr id="5" name="Google Shape;20;p1">
-            <a:extLst>
-              <a:ext uri="{FF2B5EF4-FFF2-40B4-BE49-F238E27FC236}">
-                <a16:creationId xmlns:a16="http://schemas.microsoft.com/office/drawing/2014/main" id="{4DC545BD-2CEE-43A7-A94A-B45A0912F3D1}"/>
-              </a:ext>
-            </a:extLst>
-          </p:cNvPr>
-          <p:cNvSpPr/>
-          <p:nvPr/>
-        </p:nvSpPr>
-        <p:spPr>
-          <a:xfrm>
-            <a:off x="701335" y="964554"/>
-            <a:ext cx="10786368" cy="5542777"/>
-          </a:xfrm>
-          <a:prstGeom prst="rect">
-            <a:avLst/>
-          </a:prstGeom>
-          <a:solidFill>
-            <a:schemeClr val="lt1"/>
-          </a:solidFill>
-          <a:ln w="19050" cap="flat" cmpd="sng">
-            <a:solidFill>
-              <a:schemeClr val="accent5"/>
-            </a:solidFill>
-            <a:prstDash val="solid"/>
-            <a:miter lim="800000"/>
-            <a:headEnd type="none" w="sm" len="sm"/>
-            <a:tailEnd type="none" w="sm" len="sm"/>
-          </a:ln>
-        </p:spPr>
-        <p:txBody>
-          <a:bodyPr spcFirstLastPara="1" wrap="square" lIns="91425" tIns="45700" rIns="91425" bIns="45700" anchor="ctr" anchorCtr="0">
-            <a:noAutofit/>
-          </a:bodyPr>
-          <a:lstStyle/>
-          <a:p>
-            <a:pPr marL="0" marR="0" lvl="0" indent="0" algn="l" rtl="0">
-              <a:lnSpc>
-                <a:spcPct val="100000"/>
-              </a:lnSpc>
-              <a:spcBef>
-                <a:spcPts val="0"/>
-              </a:spcBef>
-              <a:spcAft>
-                <a:spcPts val="0"/>
-              </a:spcAft>
-              <a:buClr>
-                <a:srgbClr val="000000"/>
-              </a:buClr>
-              <a:buSzPts val="1428"/>
-              <a:buFont typeface="Arial"/>
-              <a:buNone/>
-            </a:pPr>
-            <a:endParaRPr sz="1428" b="0" i="0" u="none" strike="noStrike" cap="none">
-              <a:solidFill>
-                <a:srgbClr val="000000"/>
-              </a:solidFill>
-              <a:latin typeface="Arial"/>
-              <a:ea typeface="Arial"/>
-              <a:cs typeface="Arial"/>
-              <a:sym typeface="Arial"/>
-            </a:endParaRPr>
-          </a:p>
-        </p:txBody>
-      </p:sp>
-      <p:sp>
-        <p:nvSpPr>
           <p:cNvPr id="4" name="Google Shape;45;p1">
             <a:extLst>
               <a:ext uri="{FF2B5EF4-FFF2-40B4-BE49-F238E27FC236}">
@@ -5616,7 +5553,7 @@
             <a:r>
               <a:rPr lang="en-US" sz="2800" b="1" dirty="0">
                 <a:solidFill>
-                  <a:schemeClr val="accent1"/>
+                  <a:srgbClr val="29748D"/>
                 </a:solidFill>
               </a:rPr>
               <a:t>Recommendation and key findings</a:t>
@@ -5920,7 +5857,11 @@
           <a:lstStyle/>
           <a:p>
             <a:r>
-              <a:rPr lang="en-US" sz="2800" b="1" dirty="0"/>
+              <a:rPr lang="en-US" sz="2800" b="1" dirty="0">
+                <a:solidFill>
+                  <a:srgbClr val="29748D"/>
+                </a:solidFill>
+              </a:rPr>
               <a:t>Modeling results and analysis</a:t>
             </a:r>
           </a:p>
@@ -6005,7 +5946,7 @@
           <a:graphicData uri="http://schemas.openxmlformats.org/presentationml/2006/ole">
             <mc:AlternateContent xmlns:mc="http://schemas.openxmlformats.org/markup-compatibility/2006">
               <mc:Choice xmlns:v="urn:schemas-microsoft-com:vml" Requires="v">
-                <p:oleObj spid="_x0000_s1035" name="Image" r:id="rId3" imgW="15949080" imgH="7885440" progId="Photoshop.Image.13">
+                <p:oleObj spid="_x0000_s1037" name="Image" r:id="rId3" imgW="15949080" imgH="7885440" progId="Photoshop.Image.13">
                   <p:embed/>
                 </p:oleObj>
               </mc:Choice>
@@ -7029,7 +6970,11 @@
           <a:lstStyle/>
           <a:p>
             <a:r>
-              <a:rPr lang="en-US" sz="2800" b="1" dirty="0"/>
+              <a:rPr lang="en-US" sz="2800" b="1" dirty="0">
+                <a:solidFill>
+                  <a:srgbClr val="29748D"/>
+                </a:solidFill>
+              </a:rPr>
               <a:t>Modeling results and analysis (cont.)</a:t>
             </a:r>
           </a:p>
@@ -7470,7 +7415,11 @@
           <a:lstStyle/>
           <a:p>
             <a:r>
-              <a:rPr lang="en-US" sz="2800" b="1" dirty="0"/>
+              <a:rPr lang="en-US" sz="2800" b="1" dirty="0">
+                <a:solidFill>
+                  <a:srgbClr val="29748D"/>
+                </a:solidFill>
+              </a:rPr>
               <a:t>Modeling results and analysis (cont.)</a:t>
             </a:r>
           </a:p>
@@ -7670,7 +7619,7 @@
           <a:p>
             <a:r>
               <a:rPr lang="en-US" sz="2400" dirty="0"/>
-              <a:t>Ranking of Big Mountain on key features and price among market share</a:t>
+              <a:t>Ranking of Big Mountain on key features and price among the market share</a:t>
             </a:r>
           </a:p>
         </p:txBody>
@@ -8060,7 +8009,11 @@
           <a:lstStyle/>
           <a:p>
             <a:r>
-              <a:rPr lang="en-US" sz="2800" b="1" dirty="0"/>
+              <a:rPr lang="en-US" sz="2800" b="1" dirty="0">
+                <a:solidFill>
+                  <a:srgbClr val="29748D"/>
+                </a:solidFill>
+              </a:rPr>
               <a:t>Modeling results and analysis (cont.)</a:t>
             </a:r>
           </a:p>
@@ -8260,7 +8213,7 @@
           <a:p>
             <a:r>
               <a:rPr lang="en-US" sz="2400" dirty="0"/>
-              <a:t>Scenarios modeling of closing down the least used runs, probably no more than 5 runs</a:t>
+              <a:t>Scenarios modeling of closing down the least used runs, but no more than 5 runs</a:t>
             </a:r>
           </a:p>
         </p:txBody>
@@ -8423,7 +8376,11 @@
           <a:lstStyle/>
           <a:p>
             <a:r>
-              <a:rPr lang="en-US" sz="2800" b="1" dirty="0"/>
+              <a:rPr lang="en-US" sz="2800" b="1" dirty="0">
+                <a:solidFill>
+                  <a:srgbClr val="29748D"/>
+                </a:solidFill>
+              </a:rPr>
               <a:t>Summary and conclusion</a:t>
             </a:r>
           </a:p>
@@ -8635,13 +8592,13 @@
           <a:p>
             <a:r>
               <a:rPr lang="en-US" sz="2400" dirty="0"/>
-              <a:t>More data can be obtained for better prediction and estimation of revenue increase, such as visitor number and average staying days data, business costs, weather temperature, geographic latitude, transportation convenience and accommodations like hotels and restaurants numbers on site, etc.</a:t>
+              <a:t>More data can be obtained for better prediction and estimation of revenue increase, such as visitor number and average staying days data, weather temperature, geographic latitude, transportation convenience, accommodations like hotels and restaurants numbers on site, and business costs, etc.</a:t>
             </a:r>
           </a:p>
           <a:p>
             <a:r>
               <a:rPr lang="en-US" sz="2400" dirty="0"/>
-              <a:t>Small tests can be done to test modeled improvement scenarios, with comparison and visitor feedbacks to see primary results and then further prediction.</a:t>
+              <a:t>Small tests can be done to test modeled improvement scenarios, with comparison and visitor feedbacks to see primary results and then further prediction and recommendations.</a:t>
             </a:r>
           </a:p>
         </p:txBody>
@@ -8694,14 +8651,15 @@
         </p:nvSpPr>
         <p:spPr>
           <a:xfrm>
-            <a:off x="4264610" y="2540154"/>
-            <a:ext cx="3662779" cy="1325563"/>
+            <a:off x="4719961" y="2646687"/>
+            <a:ext cx="2752078" cy="1325563"/>
           </a:xfrm>
         </p:spPr>
         <p:txBody>
           <a:bodyPr/>
           <a:lstStyle/>
           <a:p>
+            <a:pPr algn="ctr"/>
             <a:r>
               <a:rPr lang="en-US" dirty="0"/>
               <a:t>Thank you!</a:t>

</xml_diff>

<commit_message>
Minor content updates of PPT
</commit_message>
<xml_diff>
--- a/reports/Presentation for Management Team.pptx
+++ b/reports/Presentation for Management Team.pptx
@@ -5946,7 +5946,7 @@
           <a:graphicData uri="http://schemas.openxmlformats.org/presentationml/2006/ole">
             <mc:AlternateContent xmlns:mc="http://schemas.openxmlformats.org/markup-compatibility/2006">
               <mc:Choice xmlns:v="urn:schemas-microsoft-com:vml" Requires="v">
-                <p:oleObj spid="_x0000_s1037" name="Image" r:id="rId3" imgW="15949080" imgH="7885440" progId="Photoshop.Image.13">
+                <p:oleObj spid="_x0000_s1044" name="Image" r:id="rId3" imgW="15949080" imgH="7885440" progId="Photoshop.Image.13">
                   <p:embed/>
                 </p:oleObj>
               </mc:Choice>
@@ -6151,7 +6151,7 @@
           <p:nvPr>
             <p:extLst>
               <p:ext uri="{D42A27DB-BD31-4B8C-83A1-F6EECF244321}">
-                <p14:modId xmlns:p14="http://schemas.microsoft.com/office/powerpoint/2010/main" val="2014420418"/>
+                <p14:modId xmlns:p14="http://schemas.microsoft.com/office/powerpoint/2010/main" val="4058544433"/>
               </p:ext>
             </p:extLst>
           </p:nvPr>
@@ -6410,7 +6410,7 @@
                     <a:lstStyle/>
                     <a:p>
                       <a:pPr algn="ctr" fontAlgn="b"/>
-                      <a:endParaRPr lang="en-US" sz="2000" b="0" i="0" u="none" strike="noStrike">
+                      <a:endParaRPr lang="en-US" sz="2000" b="0" i="0" u="none" strike="noStrike" dirty="0">
                         <a:solidFill>
                           <a:srgbClr val="000000"/>
                         </a:solidFill>
@@ -6701,15 +6701,8 @@
                           <a:effectLst/>
                           <a:latin typeface="+mn-lt"/>
                         </a:rPr>
-                        <a:t>$9.71 </a:t>
+                        <a:t>$9.71</a:t>
                       </a:r>
-                      <a:endParaRPr lang="en-US" sz="2000" b="0" i="0" u="none" strike="noStrike" dirty="0">
-                        <a:solidFill>
-                          <a:srgbClr val="000000"/>
-                        </a:solidFill>
-                        <a:effectLst/>
-                        <a:latin typeface="+mn-lt"/>
-                      </a:endParaRPr>
                     </a:p>
                   </a:txBody>
                   <a:tcPr marL="7620" marR="7620" marT="7620" marB="0" anchor="ctr">
@@ -6761,7 +6754,15 @@
           <a:p>
             <a:r>
               <a:rPr lang="en-US" sz="1600" i="1" dirty="0"/>
-              <a:t>The closer R2 to 1, the better performance</a:t>
+              <a:t>The closer R</a:t>
+            </a:r>
+            <a:r>
+              <a:rPr lang="en-US" sz="1600" i="1" baseline="30000" dirty="0"/>
+              <a:t>2</a:t>
+            </a:r>
+            <a:r>
+              <a:rPr lang="en-US" sz="1600" i="1" dirty="0"/>
+              <a:t> to 1, the better performance</a:t>
             </a:r>
           </a:p>
           <a:p>
@@ -6781,13 +6782,15 @@
               </a:ext>
             </a:extLst>
           </p:cNvPr>
-          <p:cNvCxnSpPr/>
+          <p:cNvCxnSpPr>
+            <a:cxnSpLocks/>
+          </p:cNvCxnSpPr>
           <p:nvPr/>
         </p:nvCxnSpPr>
         <p:spPr>
-          <a:xfrm flipH="1">
-            <a:off x="8096435" y="5885893"/>
-            <a:ext cx="506027" cy="0"/>
+          <a:xfrm>
+            <a:off x="8248790" y="5885893"/>
+            <a:ext cx="699901" cy="0"/>
           </a:xfrm>
           <a:prstGeom prst="straightConnector1">
             <a:avLst/>
@@ -6825,8 +6828,8 @@
         </p:nvSpPr>
         <p:spPr>
           <a:xfrm>
-            <a:off x="8673576" y="5716616"/>
-            <a:ext cx="2125466" cy="338554"/>
+            <a:off x="9082020" y="5716616"/>
+            <a:ext cx="1589010" cy="338554"/>
           </a:xfrm>
           <a:prstGeom prst="rect">
             <a:avLst/>
@@ -6841,7 +6844,370 @@
           <a:p>
             <a:r>
               <a:rPr lang="en-US" sz="1600" i="1" dirty="0"/>
-              <a:t>Selected final model</a:t>
+              <a:t>Selected model</a:t>
+            </a:r>
+          </a:p>
+        </p:txBody>
+      </p:sp>
+      <p:sp>
+        <p:nvSpPr>
+          <p:cNvPr id="14" name="TextBox 13">
+            <a:extLst>
+              <a:ext uri="{FF2B5EF4-FFF2-40B4-BE49-F238E27FC236}">
+                <a16:creationId xmlns:a16="http://schemas.microsoft.com/office/drawing/2014/main" id="{EE36E597-3734-49C3-A8AF-BA112DE0B514}"/>
+              </a:ext>
+            </a:extLst>
+          </p:cNvPr>
+          <p:cNvSpPr txBox="1"/>
+          <p:nvPr/>
+        </p:nvSpPr>
+        <p:spPr>
+          <a:xfrm>
+            <a:off x="724960" y="5726093"/>
+            <a:ext cx="270679" cy="400110"/>
+          </a:xfrm>
+          <a:prstGeom prst="rect">
+            <a:avLst/>
+          </a:prstGeom>
+          <a:noFill/>
+        </p:spPr>
+        <p:txBody>
+          <a:bodyPr wrap="square" rtlCol="0">
+            <a:spAutoFit/>
+          </a:bodyPr>
+          <a:lstStyle/>
+          <a:p>
+            <a:r>
+              <a:rPr lang="en-US" sz="2000" dirty="0">
+                <a:solidFill>
+                  <a:srgbClr val="FF6600"/>
+                </a:solidFill>
+              </a:rPr>
+              <a:t>*</a:t>
+            </a:r>
+          </a:p>
+        </p:txBody>
+      </p:sp>
+      <p:cxnSp>
+        <p:nvCxnSpPr>
+          <p:cNvPr id="20" name="Straight Arrow Connector 19">
+            <a:extLst>
+              <a:ext uri="{FF2B5EF4-FFF2-40B4-BE49-F238E27FC236}">
+                <a16:creationId xmlns:a16="http://schemas.microsoft.com/office/drawing/2014/main" id="{7FC803B4-266A-45F2-8717-EFE916420284}"/>
+              </a:ext>
+            </a:extLst>
+          </p:cNvPr>
+          <p:cNvCxnSpPr>
+            <a:cxnSpLocks/>
+          </p:cNvCxnSpPr>
+          <p:nvPr/>
+        </p:nvCxnSpPr>
+        <p:spPr>
+          <a:xfrm flipV="1">
+            <a:off x="9756907" y="5307969"/>
+            <a:ext cx="0" cy="418124"/>
+          </a:xfrm>
+          <a:prstGeom prst="straightConnector1">
+            <a:avLst/>
+          </a:prstGeom>
+          <a:ln>
+            <a:tailEnd type="triangle"/>
+          </a:ln>
+        </p:spPr>
+        <p:style>
+          <a:lnRef idx="1">
+            <a:schemeClr val="accent1"/>
+          </a:lnRef>
+          <a:fillRef idx="0">
+            <a:schemeClr val="accent1"/>
+          </a:fillRef>
+          <a:effectRef idx="0">
+            <a:schemeClr val="accent1"/>
+          </a:effectRef>
+          <a:fontRef idx="minor">
+            <a:schemeClr val="tx1"/>
+          </a:fontRef>
+        </p:style>
+      </p:cxnSp>
+      <p:graphicFrame>
+        <p:nvGraphicFramePr>
+          <p:cNvPr id="10" name="Table 9">
+            <a:extLst>
+              <a:ext uri="{FF2B5EF4-FFF2-40B4-BE49-F238E27FC236}">
+                <a16:creationId xmlns:a16="http://schemas.microsoft.com/office/drawing/2014/main" id="{E69737C0-186A-4DFC-B622-0C6662315486}"/>
+              </a:ext>
+            </a:extLst>
+          </p:cNvPr>
+          <p:cNvGraphicFramePr>
+            <a:graphicFrameLocks noGrp="1"/>
+          </p:cNvGraphicFramePr>
+          <p:nvPr>
+            <p:extLst>
+              <p:ext uri="{D42A27DB-BD31-4B8C-83A1-F6EECF244321}">
+                <p14:modId xmlns:p14="http://schemas.microsoft.com/office/powerpoint/2010/main" val="2456042002"/>
+              </p:ext>
+            </p:extLst>
+          </p:nvPr>
+        </p:nvGraphicFramePr>
+        <p:xfrm>
+          <a:off x="8277150" y="4703449"/>
+          <a:ext cx="3185649" cy="502920"/>
+        </p:xfrm>
+        <a:graphic>
+          <a:graphicData uri="http://schemas.openxmlformats.org/drawingml/2006/table">
+            <a:tbl>
+              <a:tblPr>
+                <a:tableStyleId>{5C22544A-7EE6-4342-B048-85BDC9FD1C3A}</a:tableStyleId>
+              </a:tblPr>
+              <a:tblGrid>
+                <a:gridCol w="1134907">
+                  <a:extLst>
+                    <a:ext uri="{9D8B030D-6E8A-4147-A177-3AD203B41FA5}">
+                      <a16:colId xmlns:a16="http://schemas.microsoft.com/office/drawing/2014/main" val="2553697919"/>
+                    </a:ext>
+                  </a:extLst>
+                </a:gridCol>
+                <a:gridCol w="1260629">
+                  <a:extLst>
+                    <a:ext uri="{9D8B030D-6E8A-4147-A177-3AD203B41FA5}">
+                      <a16:colId xmlns:a16="http://schemas.microsoft.com/office/drawing/2014/main" val="3117766235"/>
+                    </a:ext>
+                  </a:extLst>
+                </a:gridCol>
+                <a:gridCol w="790113">
+                  <a:extLst>
+                    <a:ext uri="{9D8B030D-6E8A-4147-A177-3AD203B41FA5}">
+                      <a16:colId xmlns:a16="http://schemas.microsoft.com/office/drawing/2014/main" val="3466178090"/>
+                    </a:ext>
+                  </a:extLst>
+                </a:gridCol>
+              </a:tblGrid>
+              <a:tr h="182880">
+                <a:tc>
+                  <a:txBody>
+                    <a:bodyPr/>
+                    <a:lstStyle/>
+                    <a:p>
+                      <a:pPr algn="ctr" fontAlgn="ctr"/>
+                      <a:r>
+                        <a:rPr lang="en-US" sz="1600" b="0" i="0" u="none" strike="noStrike" dirty="0">
+                          <a:solidFill>
+                            <a:srgbClr val="000000"/>
+                          </a:solidFill>
+                          <a:effectLst/>
+                          <a:latin typeface="Calibri" panose="020F0502020204030204" pitchFamily="34" charset="0"/>
+                        </a:rPr>
+                        <a:t>Result</a:t>
+                      </a:r>
+                    </a:p>
+                  </a:txBody>
+                  <a:tcPr marL="7620" marR="7620" marT="7620" marB="0" anchor="ctr">
+                    <a:solidFill>
+                      <a:schemeClr val="accent4">
+                        <a:lumMod val="40000"/>
+                        <a:lumOff val="60000"/>
+                      </a:schemeClr>
+                    </a:solidFill>
+                  </a:tcPr>
+                </a:tc>
+                <a:tc>
+                  <a:txBody>
+                    <a:bodyPr/>
+                    <a:lstStyle/>
+                    <a:p>
+                      <a:pPr algn="ctr" fontAlgn="ctr"/>
+                      <a:r>
+                        <a:rPr lang="en-US" sz="1600" u="none" strike="noStrike" dirty="0">
+                          <a:effectLst/>
+                        </a:rPr>
+                        <a:t>Predicted Price</a:t>
+                      </a:r>
+                      <a:endParaRPr lang="en-US" sz="1600" b="0" i="0" u="none" strike="noStrike" dirty="0">
+                        <a:solidFill>
+                          <a:srgbClr val="000000"/>
+                        </a:solidFill>
+                        <a:effectLst/>
+                        <a:latin typeface="Calibri" panose="020F0502020204030204" pitchFamily="34" charset="0"/>
+                      </a:endParaRPr>
+                    </a:p>
+                  </a:txBody>
+                  <a:tcPr marL="7620" marR="7620" marT="7620" marB="0" anchor="ctr">
+                    <a:solidFill>
+                      <a:schemeClr val="accent4">
+                        <a:lumMod val="40000"/>
+                        <a:lumOff val="60000"/>
+                      </a:schemeClr>
+                    </a:solidFill>
+                  </a:tcPr>
+                </a:tc>
+                <a:tc>
+                  <a:txBody>
+                    <a:bodyPr/>
+                    <a:lstStyle/>
+                    <a:p>
+                      <a:pPr algn="ctr" fontAlgn="ctr"/>
+                      <a:r>
+                        <a:rPr lang="en-US" sz="1600" u="none" strike="noStrike" dirty="0">
+                          <a:effectLst/>
+                        </a:rPr>
+                        <a:t>MAE</a:t>
+                      </a:r>
+                      <a:endParaRPr lang="en-US" sz="1600" b="0" i="0" u="none" strike="noStrike" dirty="0">
+                        <a:solidFill>
+                          <a:srgbClr val="000000"/>
+                        </a:solidFill>
+                        <a:effectLst/>
+                        <a:latin typeface="Calibri" panose="020F0502020204030204" pitchFamily="34" charset="0"/>
+                      </a:endParaRPr>
+                    </a:p>
+                  </a:txBody>
+                  <a:tcPr marL="7620" marR="7620" marT="7620" marB="0" anchor="ctr">
+                    <a:solidFill>
+                      <a:schemeClr val="accent4">
+                        <a:lumMod val="40000"/>
+                        <a:lumOff val="60000"/>
+                      </a:schemeClr>
+                    </a:solidFill>
+                  </a:tcPr>
+                </a:tc>
+                <a:extLst>
+                  <a:ext uri="{0D108BD9-81ED-4DB2-BD59-A6C34878D82A}">
+                    <a16:rowId xmlns:a16="http://schemas.microsoft.com/office/drawing/2014/main" val="2955692379"/>
+                  </a:ext>
+                </a:extLst>
+              </a:tr>
+              <a:tr h="182880">
+                <a:tc>
+                  <a:txBody>
+                    <a:bodyPr/>
+                    <a:lstStyle/>
+                    <a:p>
+                      <a:pPr algn="ctr" fontAlgn="ctr"/>
+                      <a:r>
+                        <a:rPr lang="en-US" sz="1600" u="none" strike="noStrike">
+                          <a:effectLst/>
+                        </a:rPr>
+                        <a:t>Big Mountain</a:t>
+                      </a:r>
+                      <a:endParaRPr lang="en-US" sz="1600" b="0" i="0" u="none" strike="noStrike">
+                        <a:solidFill>
+                          <a:srgbClr val="000000"/>
+                        </a:solidFill>
+                        <a:effectLst/>
+                        <a:latin typeface="Calibri" panose="020F0502020204030204" pitchFamily="34" charset="0"/>
+                      </a:endParaRPr>
+                    </a:p>
+                  </a:txBody>
+                  <a:tcPr marL="7620" marR="7620" marT="7620" marB="0" anchor="ctr">
+                    <a:solidFill>
+                      <a:schemeClr val="accent6">
+                        <a:lumMod val="40000"/>
+                        <a:lumOff val="60000"/>
+                      </a:schemeClr>
+                    </a:solidFill>
+                  </a:tcPr>
+                </a:tc>
+                <a:tc>
+                  <a:txBody>
+                    <a:bodyPr/>
+                    <a:lstStyle/>
+                    <a:p>
+                      <a:pPr algn="ctr" fontAlgn="ctr"/>
+                      <a:r>
+                        <a:rPr lang="en-US" sz="1600" u="none" strike="noStrike" dirty="0">
+                          <a:effectLst/>
+                        </a:rPr>
+                        <a:t>$92.41 </a:t>
+                      </a:r>
+                      <a:endParaRPr lang="en-US" sz="1600" b="0" i="0" u="none" strike="noStrike" dirty="0">
+                        <a:solidFill>
+                          <a:srgbClr val="000000"/>
+                        </a:solidFill>
+                        <a:effectLst/>
+                        <a:latin typeface="Calibri" panose="020F0502020204030204" pitchFamily="34" charset="0"/>
+                      </a:endParaRPr>
+                    </a:p>
+                  </a:txBody>
+                  <a:tcPr marL="7620" marR="7620" marT="7620" marB="0" anchor="ctr">
+                    <a:solidFill>
+                      <a:schemeClr val="accent6">
+                        <a:lumMod val="40000"/>
+                        <a:lumOff val="60000"/>
+                      </a:schemeClr>
+                    </a:solidFill>
+                  </a:tcPr>
+                </a:tc>
+                <a:tc>
+                  <a:txBody>
+                    <a:bodyPr/>
+                    <a:lstStyle/>
+                    <a:p>
+                      <a:pPr algn="ctr" fontAlgn="ctr"/>
+                      <a:r>
+                        <a:rPr lang="en-US" sz="1600" u="none" strike="noStrike" dirty="0">
+                          <a:effectLst/>
+                        </a:rPr>
+                        <a:t>$10.41 </a:t>
+                      </a:r>
+                      <a:endParaRPr lang="en-US" sz="1600" b="0" i="0" u="none" strike="noStrike" dirty="0">
+                        <a:solidFill>
+                          <a:srgbClr val="000000"/>
+                        </a:solidFill>
+                        <a:effectLst/>
+                        <a:latin typeface="Calibri" panose="020F0502020204030204" pitchFamily="34" charset="0"/>
+                      </a:endParaRPr>
+                    </a:p>
+                  </a:txBody>
+                  <a:tcPr marL="7620" marR="7620" marT="7620" marB="0" anchor="ctr">
+                    <a:solidFill>
+                      <a:schemeClr val="accent6">
+                        <a:lumMod val="40000"/>
+                        <a:lumOff val="60000"/>
+                      </a:schemeClr>
+                    </a:solidFill>
+                  </a:tcPr>
+                </a:tc>
+                <a:extLst>
+                  <a:ext uri="{0D108BD9-81ED-4DB2-BD59-A6C34878D82A}">
+                    <a16:rowId xmlns:a16="http://schemas.microsoft.com/office/drawing/2014/main" val="3030737066"/>
+                  </a:ext>
+                </a:extLst>
+              </a:tr>
+            </a:tbl>
+          </a:graphicData>
+        </a:graphic>
+      </p:graphicFrame>
+      <p:sp>
+        <p:nvSpPr>
+          <p:cNvPr id="24" name="TextBox 23">
+            <a:extLst>
+              <a:ext uri="{FF2B5EF4-FFF2-40B4-BE49-F238E27FC236}">
+                <a16:creationId xmlns:a16="http://schemas.microsoft.com/office/drawing/2014/main" id="{3E283931-6AE9-4454-A878-86A9931B19ED}"/>
+              </a:ext>
+            </a:extLst>
+          </p:cNvPr>
+          <p:cNvSpPr txBox="1"/>
+          <p:nvPr/>
+        </p:nvSpPr>
+        <p:spPr>
+          <a:xfrm>
+            <a:off x="9756907" y="5375045"/>
+            <a:ext cx="637544" cy="307777"/>
+          </a:xfrm>
+          <a:prstGeom prst="rect">
+            <a:avLst/>
+          </a:prstGeom>
+          <a:noFill/>
+        </p:spPr>
+        <p:txBody>
+          <a:bodyPr wrap="square" rtlCol="0">
+            <a:spAutoFit/>
+          </a:bodyPr>
+          <a:lstStyle/>
+          <a:p>
+            <a:r>
+              <a:rPr lang="en-US" sz="1400" dirty="0"/>
+              <a:t>Refit</a:t>
             </a:r>
           </a:p>
         </p:txBody>
@@ -7234,7 +7600,7 @@
           <a:p>
             <a:r>
               <a:rPr lang="en-US" sz="2400" dirty="0"/>
-              <a:t>Six key features contributing to price and prediction</a:t>
+              <a:t>Six most important features contributing to price identified</a:t>
             </a:r>
           </a:p>
         </p:txBody>
@@ -7441,8 +7807,8 @@
         </p:nvSpPr>
         <p:spPr>
           <a:xfrm>
-            <a:off x="838200" y="942081"/>
-            <a:ext cx="10515600" cy="5547495"/>
+            <a:off x="727972" y="942081"/>
+            <a:ext cx="10830078" cy="5547495"/>
           </a:xfrm>
           <a:prstGeom prst="rect">
             <a:avLst/>
@@ -7619,7 +7985,7 @@
           <a:p>
             <a:r>
               <a:rPr lang="en-US" sz="2400" dirty="0"/>
-              <a:t>Ranking of Big Mountain on key features and price among the market share</a:t>
+              <a:t>Ranking of Big Mountain on key features and current price supports a price increase</a:t>
             </a:r>
           </a:p>
         </p:txBody>
@@ -8035,8 +8401,8 @@
         </p:nvSpPr>
         <p:spPr>
           <a:xfrm>
-            <a:off x="838200" y="1100831"/>
-            <a:ext cx="10515600" cy="5388745"/>
+            <a:off x="838200" y="1022257"/>
+            <a:ext cx="10515600" cy="5467319"/>
           </a:xfrm>
           <a:prstGeom prst="rect">
             <a:avLst/>
@@ -8213,7 +8579,19 @@
           <a:p>
             <a:r>
               <a:rPr lang="en-US" sz="2400" dirty="0"/>
-              <a:t>Scenarios modeling of closing down the least used runs, but no more than 5 runs</a:t>
+              <a:t>Scenarios modeling of increasing the vertical drop by adding a run to a point 150 feet lower down could increase ticket price by $0.40.</a:t>
+            </a:r>
+          </a:p>
+          <a:p>
+            <a:r>
+              <a:rPr lang="en-US" sz="2400" dirty="0"/>
+              <a:t>Closing down the least used runs, but no more than 5 runs.</a:t>
+            </a:r>
+          </a:p>
+          <a:p>
+            <a:r>
+              <a:rPr lang="en-US" sz="2400" dirty="0"/>
+              <a:t>The other two scenarios won’t support price increase.</a:t>
             </a:r>
           </a:p>
         </p:txBody>
@@ -8244,7 +8622,7 @@
         </p:blipFill>
         <p:spPr>
           <a:xfrm>
-            <a:off x="1742290" y="2014066"/>
+            <a:off x="2522394" y="2761765"/>
             <a:ext cx="6558332" cy="3818563"/>
           </a:xfrm>
           <a:prstGeom prst="rect">

</xml_diff>